<commit_message>
testy plot character + povolena len 1 os pri hist
</commit_message>
<xml_diff>
--- a/struktura kniznice.pptx
+++ b/struktura kniznice.pptx
@@ -245,7 +245,7 @@
           <a:p>
             <a:fld id="{1CE7EBEE-9833-4BC3-9BD1-B29620C10F11}" type="datetimeFigureOut">
               <a:rPr lang="en-US" smtClean="0"/>
-              <a:t>4/21/2020</a:t>
+              <a:t>4/22/2020</a:t>
             </a:fld>
             <a:endParaRPr lang="en-US"/>
           </a:p>
@@ -415,7 +415,7 @@
           <a:p>
             <a:fld id="{1CE7EBEE-9833-4BC3-9BD1-B29620C10F11}" type="datetimeFigureOut">
               <a:rPr lang="en-US" smtClean="0"/>
-              <a:t>4/21/2020</a:t>
+              <a:t>4/22/2020</a:t>
             </a:fld>
             <a:endParaRPr lang="en-US"/>
           </a:p>
@@ -595,7 +595,7 @@
           <a:p>
             <a:fld id="{1CE7EBEE-9833-4BC3-9BD1-B29620C10F11}" type="datetimeFigureOut">
               <a:rPr lang="en-US" smtClean="0"/>
-              <a:t>4/21/2020</a:t>
+              <a:t>4/22/2020</a:t>
             </a:fld>
             <a:endParaRPr lang="en-US"/>
           </a:p>
@@ -765,7 +765,7 @@
           <a:p>
             <a:fld id="{1CE7EBEE-9833-4BC3-9BD1-B29620C10F11}" type="datetimeFigureOut">
               <a:rPr lang="en-US" smtClean="0"/>
-              <a:t>4/21/2020</a:t>
+              <a:t>4/22/2020</a:t>
             </a:fld>
             <a:endParaRPr lang="en-US"/>
           </a:p>
@@ -1009,7 +1009,7 @@
           <a:p>
             <a:fld id="{1CE7EBEE-9833-4BC3-9BD1-B29620C10F11}" type="datetimeFigureOut">
               <a:rPr lang="en-US" smtClean="0"/>
-              <a:t>4/21/2020</a:t>
+              <a:t>4/22/2020</a:t>
             </a:fld>
             <a:endParaRPr lang="en-US"/>
           </a:p>
@@ -1241,7 +1241,7 @@
           <a:p>
             <a:fld id="{1CE7EBEE-9833-4BC3-9BD1-B29620C10F11}" type="datetimeFigureOut">
               <a:rPr lang="en-US" smtClean="0"/>
-              <a:t>4/21/2020</a:t>
+              <a:t>4/22/2020</a:t>
             </a:fld>
             <a:endParaRPr lang="en-US"/>
           </a:p>
@@ -1608,7 +1608,7 @@
           <a:p>
             <a:fld id="{1CE7EBEE-9833-4BC3-9BD1-B29620C10F11}" type="datetimeFigureOut">
               <a:rPr lang="en-US" smtClean="0"/>
-              <a:t>4/21/2020</a:t>
+              <a:t>4/22/2020</a:t>
             </a:fld>
             <a:endParaRPr lang="en-US"/>
           </a:p>
@@ -1726,7 +1726,7 @@
           <a:p>
             <a:fld id="{1CE7EBEE-9833-4BC3-9BD1-B29620C10F11}" type="datetimeFigureOut">
               <a:rPr lang="en-US" smtClean="0"/>
-              <a:t>4/21/2020</a:t>
+              <a:t>4/22/2020</a:t>
             </a:fld>
             <a:endParaRPr lang="en-US"/>
           </a:p>
@@ -1821,7 +1821,7 @@
           <a:p>
             <a:fld id="{1CE7EBEE-9833-4BC3-9BD1-B29620C10F11}" type="datetimeFigureOut">
               <a:rPr lang="en-US" smtClean="0"/>
-              <a:t>4/21/2020</a:t>
+              <a:t>4/22/2020</a:t>
             </a:fld>
             <a:endParaRPr lang="en-US"/>
           </a:p>
@@ -2098,7 +2098,7 @@
           <a:p>
             <a:fld id="{1CE7EBEE-9833-4BC3-9BD1-B29620C10F11}" type="datetimeFigureOut">
               <a:rPr lang="en-US" smtClean="0"/>
-              <a:t>4/21/2020</a:t>
+              <a:t>4/22/2020</a:t>
             </a:fld>
             <a:endParaRPr lang="en-US"/>
           </a:p>
@@ -2355,7 +2355,7 @@
           <a:p>
             <a:fld id="{1CE7EBEE-9833-4BC3-9BD1-B29620C10F11}" type="datetimeFigureOut">
               <a:rPr lang="en-US" smtClean="0"/>
-              <a:t>4/21/2020</a:t>
+              <a:t>4/22/2020</a:t>
             </a:fld>
             <a:endParaRPr lang="en-US"/>
           </a:p>
@@ -2568,7 +2568,7 @@
           <a:p>
             <a:fld id="{1CE7EBEE-9833-4BC3-9BD1-B29620C10F11}" type="datetimeFigureOut">
               <a:rPr lang="en-US" smtClean="0"/>
-              <a:t>4/21/2020</a:t>
+              <a:t>4/22/2020</a:t>
             </a:fld>
             <a:endParaRPr lang="en-US"/>
           </a:p>
@@ -6959,12 +6959,527 @@
           </a:fontRef>
         </p:style>
       </p:cxnSp>
+      <p:sp>
+        <p:nvSpPr>
+          <p:cNvPr id="23" name="Rectangle 5">
+            <a:extLst>
+              <a:ext uri="{FF2B5EF4-FFF2-40B4-BE49-F238E27FC236}">
+                <a16:creationId xmlns:a16="http://schemas.microsoft.com/office/drawing/2014/main" id="{F086C626-BEC0-48BD-8BA0-F4B431321EF5}"/>
+              </a:ext>
+            </a:extLst>
+          </p:cNvPr>
+          <p:cNvSpPr/>
+          <p:nvPr/>
+        </p:nvSpPr>
+        <p:spPr>
+          <a:xfrm>
+            <a:off x="8673302" y="372010"/>
+            <a:ext cx="2250681" cy="369332"/>
+          </a:xfrm>
+          <a:prstGeom prst="rect">
+            <a:avLst/>
+          </a:prstGeom>
+          <a:solidFill>
+            <a:schemeClr val="accent5">
+              <a:lumMod val="20000"/>
+              <a:lumOff val="80000"/>
+            </a:schemeClr>
+          </a:solidFill>
+        </p:spPr>
+        <p:txBody>
+          <a:bodyPr wrap="none">
+            <a:spAutoFit/>
+          </a:bodyPr>
+          <a:lstStyle/>
+          <a:p>
+            <a:r>
+              <a:rPr lang="en-US" sz="1800" dirty="0" err="1">
+                <a:highlight>
+                  <a:srgbClr val="00FF00"/>
+                </a:highlight>
+              </a:rPr>
+              <a:t>plot.characters</a:t>
+            </a:r>
+            <a:r>
+              <a:rPr lang="sk-SK" sz="1800" dirty="0">
+                <a:highlight>
+                  <a:srgbClr val="00FF00"/>
+                </a:highlight>
+              </a:rPr>
+              <a:t> + </a:t>
+            </a:r>
+            <a:r>
+              <a:rPr lang="sk-SK" sz="1800" dirty="0" err="1">
+                <a:highlight>
+                  <a:srgbClr val="00FF00"/>
+                </a:highlight>
+              </a:rPr>
+              <a:t>tests</a:t>
+            </a:r>
+            <a:endParaRPr lang="en-US" sz="1800" dirty="0">
+              <a:highlight>
+                <a:srgbClr val="00FF00"/>
+              </a:highlight>
+            </a:endParaRPr>
+          </a:p>
+        </p:txBody>
+      </p:sp>
+      <p:sp>
+        <p:nvSpPr>
+          <p:cNvPr id="25" name="Rectangle 5">
+            <a:extLst>
+              <a:ext uri="{FF2B5EF4-FFF2-40B4-BE49-F238E27FC236}">
+                <a16:creationId xmlns:a16="http://schemas.microsoft.com/office/drawing/2014/main" id="{67236BD9-559D-4261-B595-8D0553FF684E}"/>
+              </a:ext>
+            </a:extLst>
+          </p:cNvPr>
+          <p:cNvSpPr/>
+          <p:nvPr/>
+        </p:nvSpPr>
+        <p:spPr>
+          <a:xfrm>
+            <a:off x="8673302" y="6482577"/>
+            <a:ext cx="2250681" cy="369332"/>
+          </a:xfrm>
+          <a:prstGeom prst="rect">
+            <a:avLst/>
+          </a:prstGeom>
+          <a:solidFill>
+            <a:schemeClr val="accent5">
+              <a:lumMod val="20000"/>
+              <a:lumOff val="80000"/>
+            </a:schemeClr>
+          </a:solidFill>
+        </p:spPr>
+        <p:txBody>
+          <a:bodyPr wrap="none">
+            <a:spAutoFit/>
+          </a:bodyPr>
+          <a:lstStyle/>
+          <a:p>
+            <a:r>
+              <a:rPr lang="en-US" sz="1800" dirty="0" err="1">
+                <a:highlight>
+                  <a:srgbClr val="00FF00"/>
+                </a:highlight>
+              </a:rPr>
+              <a:t>plot.characters</a:t>
+            </a:r>
+            <a:r>
+              <a:rPr lang="sk-SK" sz="1800" dirty="0">
+                <a:highlight>
+                  <a:srgbClr val="00FF00"/>
+                </a:highlight>
+              </a:rPr>
+              <a:t> + </a:t>
+            </a:r>
+            <a:r>
+              <a:rPr lang="sk-SK" sz="1800" dirty="0" err="1">
+                <a:highlight>
+                  <a:srgbClr val="00FF00"/>
+                </a:highlight>
+              </a:rPr>
+              <a:t>tests</a:t>
+            </a:r>
+            <a:endParaRPr lang="en-US" sz="1800" dirty="0">
+              <a:highlight>
+                <a:srgbClr val="00FF00"/>
+              </a:highlight>
+            </a:endParaRPr>
+          </a:p>
+        </p:txBody>
+      </p:sp>
+      <p:sp>
+        <p:nvSpPr>
+          <p:cNvPr id="26" name="Obdĺžnik 25">
+            <a:extLst>
+              <a:ext uri="{FF2B5EF4-FFF2-40B4-BE49-F238E27FC236}">
+                <a16:creationId xmlns:a16="http://schemas.microsoft.com/office/drawing/2014/main" id="{1DF4781B-A66F-4B6A-9EBA-822881DD904A}"/>
+              </a:ext>
+            </a:extLst>
+          </p:cNvPr>
+          <p:cNvSpPr/>
+          <p:nvPr/>
+        </p:nvSpPr>
+        <p:spPr>
+          <a:xfrm>
+            <a:off x="4830500" y="9462974"/>
+            <a:ext cx="3598677" cy="400110"/>
+          </a:xfrm>
+          <a:prstGeom prst="rect">
+            <a:avLst/>
+          </a:prstGeom>
+        </p:spPr>
+        <p:txBody>
+          <a:bodyPr wrap="none">
+            <a:spAutoFit/>
+          </a:bodyPr>
+          <a:lstStyle/>
+          <a:p>
+            <a:r>
+              <a:rPr lang="en-GB" sz="2000" dirty="0" err="1">
+                <a:highlight>
+                  <a:srgbClr val="00FF00"/>
+                </a:highlight>
+              </a:rPr>
+              <a:t>plot.addLabels</a:t>
+            </a:r>
+            <a:r>
+              <a:rPr lang="en-GB" sz="2000" dirty="0">
+                <a:highlight>
+                  <a:srgbClr val="00FF00"/>
+                </a:highlight>
+              </a:rPr>
+              <a:t>.</a:t>
+            </a:r>
+            <a:r>
+              <a:rPr lang="sk-SK" sz="2000" dirty="0" err="1">
+                <a:highlight>
+                  <a:srgbClr val="00FF00"/>
+                </a:highlight>
+              </a:rPr>
+              <a:t>characters</a:t>
+            </a:r>
+            <a:r>
+              <a:rPr lang="sk-SK" sz="2000" dirty="0">
+                <a:highlight>
+                  <a:srgbClr val="00FF00"/>
+                </a:highlight>
+              </a:rPr>
+              <a:t> </a:t>
+            </a:r>
+            <a:r>
+              <a:rPr lang="sk-SK" sz="2000" dirty="0">
+                <a:highlight>
+                  <a:srgbClr val="FF0000"/>
+                </a:highlight>
+              </a:rPr>
+              <a:t>+ </a:t>
+            </a:r>
+            <a:r>
+              <a:rPr lang="sk-SK" sz="2000" dirty="0" err="1">
+                <a:highlight>
+                  <a:srgbClr val="FF0000"/>
+                </a:highlight>
+              </a:rPr>
+              <a:t>tests</a:t>
+            </a:r>
+            <a:endParaRPr lang="en-GB" sz="2000" dirty="0">
+              <a:highlight>
+                <a:srgbClr val="FF0000"/>
+              </a:highlight>
+            </a:endParaRPr>
+          </a:p>
+        </p:txBody>
+      </p:sp>
+      <p:sp>
+        <p:nvSpPr>
+          <p:cNvPr id="27" name="Obdĺžnik 26">
+            <a:extLst>
+              <a:ext uri="{FF2B5EF4-FFF2-40B4-BE49-F238E27FC236}">
+                <a16:creationId xmlns:a16="http://schemas.microsoft.com/office/drawing/2014/main" id="{390FDF3E-5F64-4629-B75D-70ADBC383733}"/>
+              </a:ext>
+            </a:extLst>
+          </p:cNvPr>
+          <p:cNvSpPr/>
+          <p:nvPr/>
+        </p:nvSpPr>
+        <p:spPr>
+          <a:xfrm>
+            <a:off x="4806329" y="3609330"/>
+            <a:ext cx="3598677" cy="400110"/>
+          </a:xfrm>
+          <a:prstGeom prst="rect">
+            <a:avLst/>
+          </a:prstGeom>
+        </p:spPr>
+        <p:txBody>
+          <a:bodyPr wrap="none">
+            <a:spAutoFit/>
+          </a:bodyPr>
+          <a:lstStyle/>
+          <a:p>
+            <a:r>
+              <a:rPr lang="en-GB" sz="2000" dirty="0" err="1">
+                <a:highlight>
+                  <a:srgbClr val="00FF00"/>
+                </a:highlight>
+              </a:rPr>
+              <a:t>plot.addLabels</a:t>
+            </a:r>
+            <a:r>
+              <a:rPr lang="en-GB" sz="2000" dirty="0">
+                <a:highlight>
+                  <a:srgbClr val="00FF00"/>
+                </a:highlight>
+              </a:rPr>
+              <a:t>.</a:t>
+            </a:r>
+            <a:r>
+              <a:rPr lang="sk-SK" sz="2000" dirty="0" err="1">
+                <a:highlight>
+                  <a:srgbClr val="00FF00"/>
+                </a:highlight>
+              </a:rPr>
+              <a:t>characters</a:t>
+            </a:r>
+            <a:r>
+              <a:rPr lang="sk-SK" sz="2000" dirty="0">
+                <a:highlight>
+                  <a:srgbClr val="00FF00"/>
+                </a:highlight>
+              </a:rPr>
+              <a:t> </a:t>
+            </a:r>
+            <a:r>
+              <a:rPr lang="sk-SK" sz="2000" dirty="0">
+                <a:highlight>
+                  <a:srgbClr val="FF0000"/>
+                </a:highlight>
+              </a:rPr>
+              <a:t>+ </a:t>
+            </a:r>
+            <a:r>
+              <a:rPr lang="sk-SK" sz="2000" dirty="0" err="1">
+                <a:highlight>
+                  <a:srgbClr val="FF0000"/>
+                </a:highlight>
+              </a:rPr>
+              <a:t>tests</a:t>
+            </a:r>
+            <a:endParaRPr lang="en-GB" sz="2000" dirty="0">
+              <a:highlight>
+                <a:srgbClr val="FF0000"/>
+              </a:highlight>
+            </a:endParaRPr>
+          </a:p>
+        </p:txBody>
+      </p:sp>
+      <p:sp>
+        <p:nvSpPr>
+          <p:cNvPr id="30" name="Obdĺžnik 29">
+            <a:extLst>
+              <a:ext uri="{FF2B5EF4-FFF2-40B4-BE49-F238E27FC236}">
+                <a16:creationId xmlns:a16="http://schemas.microsoft.com/office/drawing/2014/main" id="{F6ACFC48-86DF-4D3A-A5E7-7C8BFE41FFF0}"/>
+              </a:ext>
+            </a:extLst>
+          </p:cNvPr>
+          <p:cNvSpPr/>
+          <p:nvPr/>
+        </p:nvSpPr>
+        <p:spPr>
+          <a:xfrm>
+            <a:off x="6711649" y="6201786"/>
+            <a:ext cx="898323" cy="400110"/>
+          </a:xfrm>
+          <a:prstGeom prst="rect">
+            <a:avLst/>
+          </a:prstGeom>
+        </p:spPr>
+        <p:txBody>
+          <a:bodyPr wrap="none">
+            <a:spAutoFit/>
+          </a:bodyPr>
+          <a:lstStyle/>
+          <a:p>
+            <a:r>
+              <a:rPr lang="sk-SK" sz="2000" dirty="0" err="1">
+                <a:highlight>
+                  <a:srgbClr val="00FFFF"/>
+                </a:highlight>
+              </a:rPr>
+              <a:t>scatter</a:t>
+            </a:r>
+            <a:endParaRPr lang="en-GB" sz="2000" dirty="0">
+              <a:highlight>
+                <a:srgbClr val="00FFFF"/>
+              </a:highlight>
+            </a:endParaRPr>
+          </a:p>
+        </p:txBody>
+      </p:sp>
+      <p:sp>
+        <p:nvSpPr>
+          <p:cNvPr id="31" name="Obdĺžnik 30">
+            <a:extLst>
+              <a:ext uri="{FF2B5EF4-FFF2-40B4-BE49-F238E27FC236}">
+                <a16:creationId xmlns:a16="http://schemas.microsoft.com/office/drawing/2014/main" id="{F4D9CCAC-1A43-46BE-B6BD-72B917456873}"/>
+              </a:ext>
+            </a:extLst>
+          </p:cNvPr>
+          <p:cNvSpPr/>
+          <p:nvPr/>
+        </p:nvSpPr>
+        <p:spPr>
+          <a:xfrm>
+            <a:off x="6825415" y="6597432"/>
+            <a:ext cx="563296" cy="400110"/>
+          </a:xfrm>
+          <a:prstGeom prst="rect">
+            <a:avLst/>
+          </a:prstGeom>
+        </p:spPr>
+        <p:txBody>
+          <a:bodyPr wrap="none">
+            <a:spAutoFit/>
+          </a:bodyPr>
+          <a:lstStyle/>
+          <a:p>
+            <a:r>
+              <a:rPr lang="sk-SK" sz="2000" dirty="0" err="1">
+                <a:highlight>
+                  <a:srgbClr val="00FFFF"/>
+                </a:highlight>
+              </a:rPr>
+              <a:t>hist</a:t>
+            </a:r>
+            <a:endParaRPr lang="en-GB" sz="2000" dirty="0">
+              <a:highlight>
+                <a:srgbClr val="00FFFF"/>
+              </a:highlight>
+            </a:endParaRPr>
+          </a:p>
+        </p:txBody>
+      </p:sp>
+      <p:sp>
+        <p:nvSpPr>
+          <p:cNvPr id="32" name="Obdĺžnik 31">
+            <a:extLst>
+              <a:ext uri="{FF2B5EF4-FFF2-40B4-BE49-F238E27FC236}">
+                <a16:creationId xmlns:a16="http://schemas.microsoft.com/office/drawing/2014/main" id="{47F0F4EB-E47E-4C87-9D48-DA1A0986A17E}"/>
+              </a:ext>
+            </a:extLst>
+          </p:cNvPr>
+          <p:cNvSpPr/>
+          <p:nvPr/>
+        </p:nvSpPr>
+        <p:spPr>
+          <a:xfrm>
+            <a:off x="11036170" y="6282522"/>
+            <a:ext cx="898323" cy="400110"/>
+          </a:xfrm>
+          <a:prstGeom prst="rect">
+            <a:avLst/>
+          </a:prstGeom>
+        </p:spPr>
+        <p:txBody>
+          <a:bodyPr wrap="none">
+            <a:spAutoFit/>
+          </a:bodyPr>
+          <a:lstStyle/>
+          <a:p>
+            <a:r>
+              <a:rPr lang="sk-SK" sz="2000" dirty="0" err="1">
+                <a:highlight>
+                  <a:srgbClr val="00FFFF"/>
+                </a:highlight>
+              </a:rPr>
+              <a:t>scatter</a:t>
+            </a:r>
+            <a:endParaRPr lang="en-GB" sz="2000" dirty="0">
+              <a:highlight>
+                <a:srgbClr val="00FFFF"/>
+              </a:highlight>
+            </a:endParaRPr>
+          </a:p>
+        </p:txBody>
+      </p:sp>
+      <p:sp>
+        <p:nvSpPr>
+          <p:cNvPr id="33" name="Obdĺžnik 32">
+            <a:extLst>
+              <a:ext uri="{FF2B5EF4-FFF2-40B4-BE49-F238E27FC236}">
+                <a16:creationId xmlns:a16="http://schemas.microsoft.com/office/drawing/2014/main" id="{EC69652C-48F1-4EE1-AA07-2814CA4CC8D5}"/>
+              </a:ext>
+            </a:extLst>
+          </p:cNvPr>
+          <p:cNvSpPr/>
+          <p:nvPr/>
+        </p:nvSpPr>
+        <p:spPr>
+          <a:xfrm>
+            <a:off x="11203683" y="6651854"/>
+            <a:ext cx="563296" cy="400110"/>
+          </a:xfrm>
+          <a:prstGeom prst="rect">
+            <a:avLst/>
+          </a:prstGeom>
+        </p:spPr>
+        <p:txBody>
+          <a:bodyPr wrap="none">
+            <a:spAutoFit/>
+          </a:bodyPr>
+          <a:lstStyle/>
+          <a:p>
+            <a:r>
+              <a:rPr lang="sk-SK" sz="2000" dirty="0" err="1">
+                <a:highlight>
+                  <a:srgbClr val="00FFFF"/>
+                </a:highlight>
+              </a:rPr>
+              <a:t>hist</a:t>
+            </a:r>
+            <a:endParaRPr lang="en-GB" sz="2000" dirty="0">
+              <a:highlight>
+                <a:srgbClr val="00FFFF"/>
+              </a:highlight>
+            </a:endParaRPr>
+          </a:p>
+        </p:txBody>
+      </p:sp>
+      <p:sp>
+        <p:nvSpPr>
+          <p:cNvPr id="34" name="Obdĺžnik 33">
+            <a:extLst>
+              <a:ext uri="{FF2B5EF4-FFF2-40B4-BE49-F238E27FC236}">
+                <a16:creationId xmlns:a16="http://schemas.microsoft.com/office/drawing/2014/main" id="{BCF63837-C4C9-492D-B834-E9D73B2CF78C}"/>
+              </a:ext>
+            </a:extLst>
+          </p:cNvPr>
+          <p:cNvSpPr/>
+          <p:nvPr/>
+        </p:nvSpPr>
+        <p:spPr>
+          <a:xfrm>
+            <a:off x="882267" y="12114076"/>
+            <a:ext cx="1463862" cy="515847"/>
+          </a:xfrm>
+          <a:prstGeom prst="rect">
+            <a:avLst/>
+          </a:prstGeom>
+        </p:spPr>
+        <p:txBody>
+          <a:bodyPr wrap="none">
+            <a:spAutoFit/>
+          </a:bodyPr>
+          <a:lstStyle/>
+          <a:p>
+            <a:r>
+              <a:rPr lang="sk-SK" dirty="0">
+                <a:solidFill>
+                  <a:srgbClr val="24292E"/>
+                </a:solidFill>
+                <a:highlight>
+                  <a:srgbClr val="FF0000"/>
+                </a:highlight>
+                <a:latin typeface="SFMono-Regular"/>
+              </a:rPr>
+              <a:t>RANGE 1</a:t>
+            </a:r>
+            <a:endParaRPr lang="en-GB" dirty="0">
+              <a:highlight>
+                <a:srgbClr val="FF0000"/>
+              </a:highlight>
+            </a:endParaRPr>
+          </a:p>
+        </p:txBody>
+      </p:sp>
       <p:cxnSp>
         <p:nvCxnSpPr>
-          <p:cNvPr id="24" name="Rovná spojnica 23">
+          <p:cNvPr id="35" name="Rovná spojnica 34">
             <a:extLst>
               <a:ext uri="{FF2B5EF4-FFF2-40B4-BE49-F238E27FC236}">
-                <a16:creationId xmlns:a16="http://schemas.microsoft.com/office/drawing/2014/main" id="{6ACCC2D8-42BF-42D3-B995-193BC0D5C277}"/>
+                <a16:creationId xmlns:a16="http://schemas.microsoft.com/office/drawing/2014/main" id="{B29B9112-0901-4D08-98A3-816EBDAC0A1D}"/>
               </a:ext>
             </a:extLst>
           </p:cNvPr>
@@ -6975,8 +7490,8 @@
         </p:nvCxnSpPr>
         <p:spPr>
           <a:xfrm flipH="1" flipV="1">
-            <a:off x="11040191" y="11015505"/>
-            <a:ext cx="2828209" cy="2336209"/>
+            <a:off x="11104647" y="11221448"/>
+            <a:ext cx="2528420" cy="2130266"/>
           </a:xfrm>
           <a:prstGeom prst="line">
             <a:avLst/>
@@ -7002,136 +7517,49 @@
           </a:fontRef>
         </p:style>
       </p:cxnSp>
-      <p:sp>
-        <p:nvSpPr>
-          <p:cNvPr id="23" name="Rectangle 5">
+      <p:cxnSp>
+        <p:nvCxnSpPr>
+          <p:cNvPr id="43" name="Rovná spojnica 42">
             <a:extLst>
               <a:ext uri="{FF2B5EF4-FFF2-40B4-BE49-F238E27FC236}">
-                <a16:creationId xmlns:a16="http://schemas.microsoft.com/office/drawing/2014/main" id="{F086C626-BEC0-48BD-8BA0-F4B431321EF5}"/>
+                <a16:creationId xmlns:a16="http://schemas.microsoft.com/office/drawing/2014/main" id="{FA387F07-895B-4751-8BE5-660A4C6EB91E}"/>
               </a:ext>
             </a:extLst>
           </p:cNvPr>
-          <p:cNvSpPr/>
-          <p:nvPr/>
-        </p:nvSpPr>
-        <p:spPr>
-          <a:xfrm>
-            <a:off x="8673302" y="372010"/>
-            <a:ext cx="2250681" cy="369332"/>
-          </a:xfrm>
-          <a:prstGeom prst="rect">
-            <a:avLst/>
-          </a:prstGeom>
-          <a:solidFill>
-            <a:schemeClr val="accent5">
-              <a:lumMod val="20000"/>
-              <a:lumOff val="80000"/>
-            </a:schemeClr>
-          </a:solidFill>
-        </p:spPr>
-        <p:txBody>
-          <a:bodyPr wrap="none">
-            <a:spAutoFit/>
-          </a:bodyPr>
-          <a:lstStyle/>
-          <a:p>
-            <a:r>
-              <a:rPr lang="en-US" sz="1800" dirty="0" err="1">
-                <a:highlight>
-                  <a:srgbClr val="00FF00"/>
-                </a:highlight>
-              </a:rPr>
-              <a:t>plot.characters</a:t>
-            </a:r>
-            <a:r>
-              <a:rPr lang="sk-SK" sz="1800" dirty="0">
-                <a:highlight>
-                  <a:srgbClr val="00FF00"/>
-                </a:highlight>
-              </a:rPr>
-              <a:t> + </a:t>
-            </a:r>
-            <a:r>
-              <a:rPr lang="sk-SK" sz="1800" dirty="0" err="1">
-                <a:highlight>
-                  <a:srgbClr val="00FF00"/>
-                </a:highlight>
-              </a:rPr>
-              <a:t>tests</a:t>
-            </a:r>
-            <a:endParaRPr lang="en-US" sz="1800" dirty="0">
-              <a:highlight>
-                <a:srgbClr val="00FF00"/>
-              </a:highlight>
-            </a:endParaRPr>
-          </a:p>
-        </p:txBody>
-      </p:sp>
-      <p:sp>
-        <p:nvSpPr>
-          <p:cNvPr id="25" name="Rectangle 5">
-            <a:extLst>
-              <a:ext uri="{FF2B5EF4-FFF2-40B4-BE49-F238E27FC236}">
-                <a16:creationId xmlns:a16="http://schemas.microsoft.com/office/drawing/2014/main" id="{67236BD9-559D-4261-B595-8D0553FF684E}"/>
-              </a:ext>
-            </a:extLst>
-          </p:cNvPr>
-          <p:cNvSpPr/>
-          <p:nvPr/>
-        </p:nvSpPr>
-        <p:spPr>
-          <a:xfrm>
-            <a:off x="8673302" y="6482577"/>
-            <a:ext cx="2250681" cy="369332"/>
-          </a:xfrm>
-          <a:prstGeom prst="rect">
-            <a:avLst/>
-          </a:prstGeom>
-          <a:solidFill>
-            <a:schemeClr val="accent5">
-              <a:lumMod val="20000"/>
-              <a:lumOff val="80000"/>
-            </a:schemeClr>
-          </a:solidFill>
-        </p:spPr>
-        <p:txBody>
-          <a:bodyPr wrap="none">
-            <a:spAutoFit/>
-          </a:bodyPr>
-          <a:lstStyle/>
-          <a:p>
-            <a:r>
-              <a:rPr lang="en-US" sz="1800" dirty="0" err="1">
-                <a:highlight>
-                  <a:srgbClr val="00FF00"/>
-                </a:highlight>
-              </a:rPr>
-              <a:t>plot.characters</a:t>
-            </a:r>
-            <a:r>
-              <a:rPr lang="sk-SK" sz="1800" dirty="0">
-                <a:highlight>
-                  <a:srgbClr val="00FF00"/>
-                </a:highlight>
-              </a:rPr>
-              <a:t> + </a:t>
-            </a:r>
-            <a:r>
-              <a:rPr lang="sk-SK" sz="1800" dirty="0" err="1">
-                <a:highlight>
-                  <a:srgbClr val="00FF00"/>
-                </a:highlight>
-              </a:rPr>
-              <a:t>tests</a:t>
-            </a:r>
-            <a:endParaRPr lang="en-US" sz="1800" dirty="0">
-              <a:highlight>
-                <a:srgbClr val="00FF00"/>
-              </a:highlight>
-            </a:endParaRPr>
-          </a:p>
-        </p:txBody>
-      </p:sp>
+          <p:cNvCxnSpPr>
+            <a:cxnSpLocks/>
+          </p:cNvCxnSpPr>
+          <p:nvPr/>
+        </p:nvCxnSpPr>
+        <p:spPr>
+          <a:xfrm flipV="1">
+            <a:off x="903947" y="9807150"/>
+            <a:ext cx="4284741" cy="1936107"/>
+          </a:xfrm>
+          <a:prstGeom prst="line">
+            <a:avLst/>
+          </a:prstGeom>
+          <a:ln w="76200">
+            <a:solidFill>
+              <a:schemeClr val="tx1"/>
+            </a:solidFill>
+          </a:ln>
+        </p:spPr>
+        <p:style>
+          <a:lnRef idx="1">
+            <a:schemeClr val="accent1"/>
+          </a:lnRef>
+          <a:fillRef idx="0">
+            <a:schemeClr val="accent1"/>
+          </a:fillRef>
+          <a:effectRef idx="0">
+            <a:schemeClr val="accent1"/>
+          </a:effectRef>
+          <a:fontRef idx="minor">
+            <a:schemeClr val="tx1"/>
+          </a:fontRef>
+        </p:style>
+      </p:cxnSp>
     </p:spTree>
     <p:extLst>
       <p:ext uri="{BB962C8B-B14F-4D97-AF65-F5344CB8AC3E}">

</xml_diff>